<commit_message>
Try to add settlements
</commit_message>
<xml_diff>
--- a/img/graphics.pptx
+++ b/img/graphics.pptx
@@ -121,7 +121,7 @@
 <file path=ppt/revisionInfo.xml><?xml version="1.0" encoding="utf-8"?>
 <p1510:revInfo xmlns:a="http://schemas.openxmlformats.org/drawingml/2006/main" xmlns:r="http://schemas.openxmlformats.org/officeDocument/2006/relationships" xmlns:p1510="http://schemas.microsoft.com/office/powerpoint/2015/10/main">
   <p1510:revLst>
-    <p1510:client id="{83882230-A043-4E24-8FB6-2C81627A8FB5}" v="79" dt="2022-06-07T17:54:48.142"/>
+    <p1510:client id="{83882230-A043-4E24-8FB6-2C81627A8FB5}" v="81" dt="2022-06-07T18:21:56.693"/>
   </p1510:revLst>
 </p1510:revInfo>
 </file>
@@ -131,7 +131,7 @@
   <pc:docChgLst>
     <pc:chgData name="James Madden (Student)" userId="ff286c32-06bc-431e-99c4-3bafd8948ef0" providerId="ADAL" clId="{83882230-A043-4E24-8FB6-2C81627A8FB5}"/>
     <pc:docChg chg="undo custSel addSld modSld sldOrd">
-      <pc:chgData name="James Madden (Student)" userId="ff286c32-06bc-431e-99c4-3bafd8948ef0" providerId="ADAL" clId="{83882230-A043-4E24-8FB6-2C81627A8FB5}" dt="2022-06-07T17:56:13.205" v="565" actId="207"/>
+      <pc:chgData name="James Madden (Student)" userId="ff286c32-06bc-431e-99c4-3bafd8948ef0" providerId="ADAL" clId="{83882230-A043-4E24-8FB6-2C81627A8FB5}" dt="2022-06-07T18:22:00.976" v="571" actId="1076"/>
       <pc:docMkLst>
         <pc:docMk/>
       </pc:docMkLst>
@@ -1178,7 +1178,7 @@
         </pc:cxnChg>
       </pc:sldChg>
       <pc:sldChg chg="addSp delSp modSp add mod">
-        <pc:chgData name="James Madden (Student)" userId="ff286c32-06bc-431e-99c4-3bafd8948ef0" providerId="ADAL" clId="{83882230-A043-4E24-8FB6-2C81627A8FB5}" dt="2022-06-07T17:56:13.205" v="565" actId="207"/>
+        <pc:chgData name="James Madden (Student)" userId="ff286c32-06bc-431e-99c4-3bafd8948ef0" providerId="ADAL" clId="{83882230-A043-4E24-8FB6-2C81627A8FB5}" dt="2022-06-07T18:22:00.976" v="571" actId="1076"/>
         <pc:sldMkLst>
           <pc:docMk/>
           <pc:sldMk cId="614565023" sldId="262"/>
@@ -1199,6 +1199,14 @@
             <ac:spMk id="4" creationId="{A718149B-B13F-BD3C-71D0-58F200F3C255}"/>
           </ac:spMkLst>
         </pc:spChg>
+        <pc:spChg chg="add mod">
+          <ac:chgData name="James Madden (Student)" userId="ff286c32-06bc-431e-99c4-3bafd8948ef0" providerId="ADAL" clId="{83882230-A043-4E24-8FB6-2C81627A8FB5}" dt="2022-06-07T18:21:31.936" v="567" actId="1076"/>
+          <ac:spMkLst>
+            <pc:docMk/>
+            <pc:sldMk cId="614565023" sldId="262"/>
+            <ac:spMk id="7" creationId="{86035A03-A1DE-E2A6-D9C2-8F966D55E747}"/>
+          </ac:spMkLst>
+        </pc:spChg>
         <pc:spChg chg="del">
           <ac:chgData name="James Madden (Student)" userId="ff286c32-06bc-431e-99c4-3bafd8948ef0" providerId="ADAL" clId="{83882230-A043-4E24-8FB6-2C81627A8FB5}" dt="2022-06-07T17:54:02.355" v="550" actId="478"/>
           <ac:spMkLst>
@@ -1207,6 +1215,14 @@
             <ac:spMk id="8" creationId="{3251D128-A80C-7197-46B2-A448DD31FC25}"/>
           </ac:spMkLst>
         </pc:spChg>
+        <pc:spChg chg="add mod">
+          <ac:chgData name="James Madden (Student)" userId="ff286c32-06bc-431e-99c4-3bafd8948ef0" providerId="ADAL" clId="{83882230-A043-4E24-8FB6-2C81627A8FB5}" dt="2022-06-07T18:22:00.976" v="571" actId="1076"/>
+          <ac:spMkLst>
+            <pc:docMk/>
+            <pc:sldMk cId="614565023" sldId="262"/>
+            <ac:spMk id="8" creationId="{E4132C48-98F7-39A7-1EA8-1A955E61610E}"/>
+          </ac:spMkLst>
+        </pc:spChg>
         <pc:spChg chg="mod">
           <ac:chgData name="James Madden (Student)" userId="ff286c32-06bc-431e-99c4-3bafd8948ef0" providerId="ADAL" clId="{83882230-A043-4E24-8FB6-2C81627A8FB5}" dt="2022-06-07T17:53:51.862" v="547"/>
           <ac:spMkLst>
@@ -1215,8 +1231,8 @@
             <ac:spMk id="9" creationId="{B2F1F71A-AE13-2BA8-233E-9BD2ED69E01B}"/>
           </ac:spMkLst>
         </pc:spChg>
-        <pc:spChg chg="mod">
-          <ac:chgData name="James Madden (Student)" userId="ff286c32-06bc-431e-99c4-3bafd8948ef0" providerId="ADAL" clId="{83882230-A043-4E24-8FB6-2C81627A8FB5}" dt="2022-06-07T17:56:13.205" v="565" actId="207"/>
+        <pc:spChg chg="mod ord">
+          <ac:chgData name="James Madden (Student)" userId="ff286c32-06bc-431e-99c4-3bafd8948ef0" providerId="ADAL" clId="{83882230-A043-4E24-8FB6-2C81627A8FB5}" dt="2022-06-07T18:21:39.261" v="569" actId="166"/>
           <ac:spMkLst>
             <pc:docMk/>
             <pc:sldMk cId="614565023" sldId="262"/>
@@ -9160,111 +9176,6 @@
           <a:chExt cx="0" cy="0"/>
         </a:xfrm>
       </p:grpSpPr>
-      <p:sp>
-        <p:nvSpPr>
-          <p:cNvPr id="10" name="Freeform: Shape 9">
-            <a:extLst>
-              <a:ext uri="{FF2B5EF4-FFF2-40B4-BE49-F238E27FC236}">
-                <a16:creationId xmlns:a16="http://schemas.microsoft.com/office/drawing/2014/main" id="{E993C678-40E1-9F30-2A6E-6A7CC0E2313B}"/>
-              </a:ext>
-            </a:extLst>
-          </p:cNvPr>
-          <p:cNvSpPr/>
-          <p:nvPr/>
-        </p:nvSpPr>
-        <p:spPr>
-          <a:xfrm>
-            <a:off x="2104222" y="2021199"/>
-            <a:ext cx="506776" cy="650788"/>
-          </a:xfrm>
-          <a:custGeom>
-            <a:avLst/>
-            <a:gdLst>
-              <a:gd name="connsiteX0" fmla="*/ 253388 w 506776"/>
-              <a:gd name="connsiteY0" fmla="*/ 0 h 650788"/>
-              <a:gd name="connsiteX1" fmla="*/ 506776 w 506776"/>
-              <a:gd name="connsiteY1" fmla="*/ 325394 h 650788"/>
-              <a:gd name="connsiteX2" fmla="*/ 506776 w 506776"/>
-              <a:gd name="connsiteY2" fmla="*/ 650788 h 650788"/>
-              <a:gd name="connsiteX3" fmla="*/ 0 w 506776"/>
-              <a:gd name="connsiteY3" fmla="*/ 650788 h 650788"/>
-              <a:gd name="connsiteX4" fmla="*/ 0 w 506776"/>
-              <a:gd name="connsiteY4" fmla="*/ 325394 h 650788"/>
-            </a:gdLst>
-            <a:ahLst/>
-            <a:cxnLst>
-              <a:cxn ang="0">
-                <a:pos x="connsiteX0" y="connsiteY0"/>
-              </a:cxn>
-              <a:cxn ang="0">
-                <a:pos x="connsiteX1" y="connsiteY1"/>
-              </a:cxn>
-              <a:cxn ang="0">
-                <a:pos x="connsiteX2" y="connsiteY2"/>
-              </a:cxn>
-              <a:cxn ang="0">
-                <a:pos x="connsiteX3" y="connsiteY3"/>
-              </a:cxn>
-              <a:cxn ang="0">
-                <a:pos x="connsiteX4" y="connsiteY4"/>
-              </a:cxn>
-            </a:cxnLst>
-            <a:rect l="l" t="t" r="r" b="b"/>
-            <a:pathLst>
-              <a:path w="506776" h="650788">
-                <a:moveTo>
-                  <a:pt x="253388" y="0"/>
-                </a:moveTo>
-                <a:lnTo>
-                  <a:pt x="506776" y="325394"/>
-                </a:lnTo>
-                <a:lnTo>
-                  <a:pt x="506776" y="650788"/>
-                </a:lnTo>
-                <a:lnTo>
-                  <a:pt x="0" y="650788"/>
-                </a:lnTo>
-                <a:lnTo>
-                  <a:pt x="0" y="325394"/>
-                </a:lnTo>
-                <a:close/>
-              </a:path>
-            </a:pathLst>
-          </a:custGeom>
-          <a:solidFill>
-            <a:srgbClr val="6D4C41"/>
-          </a:solidFill>
-          <a:ln>
-            <a:noFill/>
-          </a:ln>
-        </p:spPr>
-        <p:style>
-          <a:lnRef idx="2">
-            <a:schemeClr val="accent1">
-              <a:shade val="50000"/>
-            </a:schemeClr>
-          </a:lnRef>
-          <a:fillRef idx="1">
-            <a:schemeClr val="accent1"/>
-          </a:fillRef>
-          <a:effectRef idx="0">
-            <a:schemeClr val="accent1"/>
-          </a:effectRef>
-          <a:fontRef idx="minor">
-            <a:schemeClr val="lt1"/>
-          </a:fontRef>
-        </p:style>
-        <p:txBody>
-          <a:bodyPr wrap="square" rtlCol="0" anchor="ctr">
-            <a:noAutofit/>
-          </a:bodyPr>
-          <a:lstStyle/>
-          <a:p>
-            <a:pPr algn="ctr"/>
-            <a:endParaRPr lang="en-US"/>
-          </a:p>
-        </p:txBody>
-      </p:sp>
       <p:pic>
         <p:nvPicPr>
           <p:cNvPr id="6" name="Picture 5" descr="Shape, arrow&#10;&#10;Description automatically generated">
@@ -9409,6 +9320,270 @@
           </a:prstGeom>
         </p:spPr>
       </p:pic>
+      <p:sp>
+        <p:nvSpPr>
+          <p:cNvPr id="7" name="Hexagon 6">
+            <a:extLst>
+              <a:ext uri="{FF2B5EF4-FFF2-40B4-BE49-F238E27FC236}">
+                <a16:creationId xmlns:a16="http://schemas.microsoft.com/office/drawing/2014/main" id="{86035A03-A1DE-E2A6-D9C2-8F966D55E747}"/>
+              </a:ext>
+            </a:extLst>
+          </p:cNvPr>
+          <p:cNvSpPr/>
+          <p:nvPr/>
+        </p:nvSpPr>
+        <p:spPr>
+          <a:xfrm rot="16200000">
+            <a:off x="1931670" y="2209800"/>
+            <a:ext cx="2819400" cy="2438400"/>
+          </a:xfrm>
+          <a:prstGeom prst="hexagon">
+            <a:avLst/>
+          </a:prstGeom>
+          <a:solidFill>
+            <a:srgbClr val="FFF176"/>
+          </a:solidFill>
+          <a:ln w="76200">
+            <a:solidFill>
+              <a:srgbClr val="FDD835"/>
+            </a:solidFill>
+          </a:ln>
+        </p:spPr>
+        <p:style>
+          <a:lnRef idx="2">
+            <a:schemeClr val="accent1">
+              <a:shade val="50000"/>
+            </a:schemeClr>
+          </a:lnRef>
+          <a:fillRef idx="1">
+            <a:schemeClr val="accent1"/>
+          </a:fillRef>
+          <a:effectRef idx="0">
+            <a:schemeClr val="accent1"/>
+          </a:effectRef>
+          <a:fontRef idx="minor">
+            <a:schemeClr val="lt1"/>
+          </a:fontRef>
+        </p:style>
+        <p:txBody>
+          <a:bodyPr rtlCol="0" anchor="ctr"/>
+          <a:lstStyle/>
+          <a:p>
+            <a:pPr algn="ctr"/>
+            <a:endParaRPr lang="en-US"/>
+          </a:p>
+        </p:txBody>
+      </p:sp>
+      <p:sp>
+        <p:nvSpPr>
+          <p:cNvPr id="10" name="Freeform: Shape 9">
+            <a:extLst>
+              <a:ext uri="{FF2B5EF4-FFF2-40B4-BE49-F238E27FC236}">
+                <a16:creationId xmlns:a16="http://schemas.microsoft.com/office/drawing/2014/main" id="{E993C678-40E1-9F30-2A6E-6A7CC0E2313B}"/>
+              </a:ext>
+            </a:extLst>
+          </p:cNvPr>
+          <p:cNvSpPr/>
+          <p:nvPr/>
+        </p:nvSpPr>
+        <p:spPr>
+          <a:xfrm>
+            <a:off x="1949985" y="2019299"/>
+            <a:ext cx="506776" cy="650788"/>
+          </a:xfrm>
+          <a:custGeom>
+            <a:avLst/>
+            <a:gdLst>
+              <a:gd name="connsiteX0" fmla="*/ 253388 w 506776"/>
+              <a:gd name="connsiteY0" fmla="*/ 0 h 650788"/>
+              <a:gd name="connsiteX1" fmla="*/ 506776 w 506776"/>
+              <a:gd name="connsiteY1" fmla="*/ 325394 h 650788"/>
+              <a:gd name="connsiteX2" fmla="*/ 506776 w 506776"/>
+              <a:gd name="connsiteY2" fmla="*/ 650788 h 650788"/>
+              <a:gd name="connsiteX3" fmla="*/ 0 w 506776"/>
+              <a:gd name="connsiteY3" fmla="*/ 650788 h 650788"/>
+              <a:gd name="connsiteX4" fmla="*/ 0 w 506776"/>
+              <a:gd name="connsiteY4" fmla="*/ 325394 h 650788"/>
+            </a:gdLst>
+            <a:ahLst/>
+            <a:cxnLst>
+              <a:cxn ang="0">
+                <a:pos x="connsiteX0" y="connsiteY0"/>
+              </a:cxn>
+              <a:cxn ang="0">
+                <a:pos x="connsiteX1" y="connsiteY1"/>
+              </a:cxn>
+              <a:cxn ang="0">
+                <a:pos x="connsiteX2" y="connsiteY2"/>
+              </a:cxn>
+              <a:cxn ang="0">
+                <a:pos x="connsiteX3" y="connsiteY3"/>
+              </a:cxn>
+              <a:cxn ang="0">
+                <a:pos x="connsiteX4" y="connsiteY4"/>
+              </a:cxn>
+            </a:cxnLst>
+            <a:rect l="l" t="t" r="r" b="b"/>
+            <a:pathLst>
+              <a:path w="506776" h="650788">
+                <a:moveTo>
+                  <a:pt x="253388" y="0"/>
+                </a:moveTo>
+                <a:lnTo>
+                  <a:pt x="506776" y="325394"/>
+                </a:lnTo>
+                <a:lnTo>
+                  <a:pt x="506776" y="650788"/>
+                </a:lnTo>
+                <a:lnTo>
+                  <a:pt x="0" y="650788"/>
+                </a:lnTo>
+                <a:lnTo>
+                  <a:pt x="0" y="325394"/>
+                </a:lnTo>
+                <a:close/>
+              </a:path>
+            </a:pathLst>
+          </a:custGeom>
+          <a:solidFill>
+            <a:srgbClr val="6D4C41"/>
+          </a:solidFill>
+          <a:ln>
+            <a:noFill/>
+          </a:ln>
+        </p:spPr>
+        <p:style>
+          <a:lnRef idx="2">
+            <a:schemeClr val="accent1">
+              <a:shade val="50000"/>
+            </a:schemeClr>
+          </a:lnRef>
+          <a:fillRef idx="1">
+            <a:schemeClr val="accent1"/>
+          </a:fillRef>
+          <a:effectRef idx="0">
+            <a:schemeClr val="accent1"/>
+          </a:effectRef>
+          <a:fontRef idx="minor">
+            <a:schemeClr val="lt1"/>
+          </a:fontRef>
+        </p:style>
+        <p:txBody>
+          <a:bodyPr wrap="square" rtlCol="0" anchor="ctr">
+            <a:noAutofit/>
+          </a:bodyPr>
+          <a:lstStyle/>
+          <a:p>
+            <a:pPr algn="ctr"/>
+            <a:endParaRPr lang="en-US"/>
+          </a:p>
+        </p:txBody>
+      </p:sp>
+      <p:sp>
+        <p:nvSpPr>
+          <p:cNvPr id="8" name="Freeform: Shape 7">
+            <a:extLst>
+              <a:ext uri="{FF2B5EF4-FFF2-40B4-BE49-F238E27FC236}">
+                <a16:creationId xmlns:a16="http://schemas.microsoft.com/office/drawing/2014/main" id="{E4132C48-98F7-39A7-1EA8-1A955E61610E}"/>
+              </a:ext>
+            </a:extLst>
+          </p:cNvPr>
+          <p:cNvSpPr/>
+          <p:nvPr/>
+        </p:nvSpPr>
+        <p:spPr>
+          <a:xfrm>
+            <a:off x="3087981" y="1664461"/>
+            <a:ext cx="506776" cy="650788"/>
+          </a:xfrm>
+          <a:custGeom>
+            <a:avLst/>
+            <a:gdLst>
+              <a:gd name="connsiteX0" fmla="*/ 253388 w 506776"/>
+              <a:gd name="connsiteY0" fmla="*/ 0 h 650788"/>
+              <a:gd name="connsiteX1" fmla="*/ 506776 w 506776"/>
+              <a:gd name="connsiteY1" fmla="*/ 325394 h 650788"/>
+              <a:gd name="connsiteX2" fmla="*/ 506776 w 506776"/>
+              <a:gd name="connsiteY2" fmla="*/ 650788 h 650788"/>
+              <a:gd name="connsiteX3" fmla="*/ 0 w 506776"/>
+              <a:gd name="connsiteY3" fmla="*/ 650788 h 650788"/>
+              <a:gd name="connsiteX4" fmla="*/ 0 w 506776"/>
+              <a:gd name="connsiteY4" fmla="*/ 325394 h 650788"/>
+            </a:gdLst>
+            <a:ahLst/>
+            <a:cxnLst>
+              <a:cxn ang="0">
+                <a:pos x="connsiteX0" y="connsiteY0"/>
+              </a:cxn>
+              <a:cxn ang="0">
+                <a:pos x="connsiteX1" y="connsiteY1"/>
+              </a:cxn>
+              <a:cxn ang="0">
+                <a:pos x="connsiteX2" y="connsiteY2"/>
+              </a:cxn>
+              <a:cxn ang="0">
+                <a:pos x="connsiteX3" y="connsiteY3"/>
+              </a:cxn>
+              <a:cxn ang="0">
+                <a:pos x="connsiteX4" y="connsiteY4"/>
+              </a:cxn>
+            </a:cxnLst>
+            <a:rect l="l" t="t" r="r" b="b"/>
+            <a:pathLst>
+              <a:path w="506776" h="650788">
+                <a:moveTo>
+                  <a:pt x="253388" y="0"/>
+                </a:moveTo>
+                <a:lnTo>
+                  <a:pt x="506776" y="325394"/>
+                </a:lnTo>
+                <a:lnTo>
+                  <a:pt x="506776" y="650788"/>
+                </a:lnTo>
+                <a:lnTo>
+                  <a:pt x="0" y="650788"/>
+                </a:lnTo>
+                <a:lnTo>
+                  <a:pt x="0" y="325394"/>
+                </a:lnTo>
+                <a:close/>
+              </a:path>
+            </a:pathLst>
+          </a:custGeom>
+          <a:solidFill>
+            <a:srgbClr val="6D4C41"/>
+          </a:solidFill>
+          <a:ln>
+            <a:noFill/>
+          </a:ln>
+        </p:spPr>
+        <p:style>
+          <a:lnRef idx="2">
+            <a:schemeClr val="accent1">
+              <a:shade val="50000"/>
+            </a:schemeClr>
+          </a:lnRef>
+          <a:fillRef idx="1">
+            <a:schemeClr val="accent1"/>
+          </a:fillRef>
+          <a:effectRef idx="0">
+            <a:schemeClr val="accent1"/>
+          </a:effectRef>
+          <a:fontRef idx="minor">
+            <a:schemeClr val="lt1"/>
+          </a:fontRef>
+        </p:style>
+        <p:txBody>
+          <a:bodyPr wrap="square" rtlCol="0" anchor="ctr">
+            <a:noAutofit/>
+          </a:bodyPr>
+          <a:lstStyle/>
+          <a:p>
+            <a:pPr algn="ctr"/>
+            <a:endParaRPr lang="en-US"/>
+          </a:p>
+        </p:txBody>
+      </p:sp>
     </p:spTree>
     <p:extLst>
       <p:ext uri="{BB962C8B-B14F-4D97-AF65-F5344CB8AC3E}">

</xml_diff>